<commit_message>
Created website and installer.
</commit_message>
<xml_diff>
--- a/Part 3/WiX Part 3.pptx
+++ b/Part 3/WiX Part 3.pptx
@@ -205,7 +205,7 @@
           <a:p>
             <a:fld id="{BE6FE14A-16AB-4C40-A7D8-3F677DBFF089}" type="datetimeFigureOut">
               <a:rPr lang="ru-RU" smtClean="0"/>
-              <a:t>07.01.2016</a:t>
+              <a:t>10.01.2016</a:t>
             </a:fld>
             <a:endParaRPr lang="ru-RU" dirty="0"/>
           </a:p>
@@ -370,7 +370,7 @@
           <a:p>
             <a:fld id="{C15A5BB7-EDD2-4B8D-93DB-AF0055258AEF}" type="datetimeFigureOut">
               <a:rPr lang="ru-RU" smtClean="0"/>
-              <a:t>07.01.2016</a:t>
+              <a:t>10.01.2016</a:t>
             </a:fld>
             <a:endParaRPr lang="ru-RU" dirty="0"/>
           </a:p>
@@ -1707,7 +1707,7 @@
           <a:p>
             <a:fld id="{FF11F0EC-4F60-4544-9956-271209A740FE}" type="datetimeFigureOut">
               <a:rPr lang="ru-RU" smtClean="0"/>
-              <a:t>07.01.2016</a:t>
+              <a:t>10.01.2016</a:t>
             </a:fld>
             <a:endParaRPr lang="ru-RU" dirty="0"/>
           </a:p>
@@ -1958,7 +1958,7 @@
           <a:p>
             <a:fld id="{FF11F0EC-4F60-4544-9956-271209A740FE}" type="datetimeFigureOut">
               <a:rPr lang="ru-RU" smtClean="0"/>
-              <a:t>07.01.2016</a:t>
+              <a:t>10.01.2016</a:t>
             </a:fld>
             <a:endParaRPr lang="ru-RU" dirty="0"/>
           </a:p>
@@ -2209,7 +2209,7 @@
           <a:p>
             <a:fld id="{FF11F0EC-4F60-4544-9956-271209A740FE}" type="datetimeFigureOut">
               <a:rPr lang="ru-RU" smtClean="0"/>
-              <a:t>07.01.2016</a:t>
+              <a:t>10.01.2016</a:t>
             </a:fld>
             <a:endParaRPr lang="ru-RU" dirty="0"/>
           </a:p>
@@ -2787,7 +2787,7 @@
           <a:p>
             <a:fld id="{FF11F0EC-4F60-4544-9956-271209A740FE}" type="datetimeFigureOut">
               <a:rPr lang="ru-RU" smtClean="0"/>
-              <a:t>07.01.2016</a:t>
+              <a:t>10.01.2016</a:t>
             </a:fld>
             <a:endParaRPr lang="ru-RU" dirty="0"/>
           </a:p>
@@ -3038,7 +3038,7 @@
           <a:p>
             <a:fld id="{FF11F0EC-4F60-4544-9956-271209A740FE}" type="datetimeFigureOut">
               <a:rPr lang="ru-RU" smtClean="0"/>
-              <a:t>07.01.2016</a:t>
+              <a:t>10.01.2016</a:t>
             </a:fld>
             <a:endParaRPr lang="ru-RU" dirty="0"/>
           </a:p>
@@ -3616,7 +3616,7 @@
           <a:p>
             <a:fld id="{FF11F0EC-4F60-4544-9956-271209A740FE}" type="datetimeFigureOut">
               <a:rPr lang="ru-RU" smtClean="0"/>
-              <a:t>07.01.2016</a:t>
+              <a:t>10.01.2016</a:t>
             </a:fld>
             <a:endParaRPr lang="ru-RU" dirty="0"/>
           </a:p>
@@ -3846,7 +3846,7 @@
           <a:p>
             <a:fld id="{FF11F0EC-4F60-4544-9956-271209A740FE}" type="datetimeFigureOut">
               <a:rPr lang="ru-RU" smtClean="0"/>
-              <a:t>07.01.2016</a:t>
+              <a:t>10.01.2016</a:t>
             </a:fld>
             <a:endParaRPr lang="ru-RU" dirty="0"/>
           </a:p>
@@ -4026,7 +4026,7 @@
           <a:p>
             <a:fld id="{FF11F0EC-4F60-4544-9956-271209A740FE}" type="datetimeFigureOut">
               <a:rPr lang="ru-RU" smtClean="0"/>
-              <a:t>07.01.2016</a:t>
+              <a:t>10.01.2016</a:t>
             </a:fld>
             <a:endParaRPr lang="ru-RU" dirty="0"/>
           </a:p>
@@ -4202,7 +4202,7 @@
           <a:p>
             <a:fld id="{FF11F0EC-4F60-4544-9956-271209A740FE}" type="datetimeFigureOut">
               <a:rPr lang="ru-RU" smtClean="0"/>
-              <a:t>07.01.2016</a:t>
+              <a:t>10.01.2016</a:t>
             </a:fld>
             <a:endParaRPr lang="ru-RU" dirty="0"/>
           </a:p>
@@ -4449,7 +4449,7 @@
           <a:p>
             <a:fld id="{FF11F0EC-4F60-4544-9956-271209A740FE}" type="datetimeFigureOut">
               <a:rPr lang="ru-RU" smtClean="0"/>
-              <a:t>07.01.2016</a:t>
+              <a:t>10.01.2016</a:t>
             </a:fld>
             <a:endParaRPr lang="ru-RU" dirty="0"/>
           </a:p>
@@ -4681,7 +4681,7 @@
           <a:p>
             <a:fld id="{FF11F0EC-4F60-4544-9956-271209A740FE}" type="datetimeFigureOut">
               <a:rPr lang="ru-RU" smtClean="0"/>
-              <a:t>07.01.2016</a:t>
+              <a:t>10.01.2016</a:t>
             </a:fld>
             <a:endParaRPr lang="ru-RU" dirty="0"/>
           </a:p>
@@ -5055,7 +5055,7 @@
           <a:p>
             <a:fld id="{FF11F0EC-4F60-4544-9956-271209A740FE}" type="datetimeFigureOut">
               <a:rPr lang="ru-RU" smtClean="0"/>
-              <a:t>07.01.2016</a:t>
+              <a:t>10.01.2016</a:t>
             </a:fld>
             <a:endParaRPr lang="ru-RU" dirty="0"/>
           </a:p>
@@ -5178,7 +5178,7 @@
           <a:p>
             <a:fld id="{FF11F0EC-4F60-4544-9956-271209A740FE}" type="datetimeFigureOut">
               <a:rPr lang="ru-RU" smtClean="0"/>
-              <a:t>07.01.2016</a:t>
+              <a:t>10.01.2016</a:t>
             </a:fld>
             <a:endParaRPr lang="ru-RU" dirty="0"/>
           </a:p>
@@ -5273,7 +5273,7 @@
           <a:p>
             <a:fld id="{FF11F0EC-4F60-4544-9956-271209A740FE}" type="datetimeFigureOut">
               <a:rPr lang="ru-RU" smtClean="0"/>
-              <a:t>07.01.2016</a:t>
+              <a:t>10.01.2016</a:t>
             </a:fld>
             <a:endParaRPr lang="ru-RU" dirty="0"/>
           </a:p>
@@ -5528,7 +5528,7 @@
           <a:p>
             <a:fld id="{FF11F0EC-4F60-4544-9956-271209A740FE}" type="datetimeFigureOut">
               <a:rPr lang="ru-RU" smtClean="0"/>
-              <a:t>07.01.2016</a:t>
+              <a:t>10.01.2016</a:t>
             </a:fld>
             <a:endParaRPr lang="ru-RU" dirty="0"/>
           </a:p>
@@ -5791,7 +5791,7 @@
           <a:p>
             <a:fld id="{FF11F0EC-4F60-4544-9956-271209A740FE}" type="datetimeFigureOut">
               <a:rPr lang="ru-RU" smtClean="0"/>
-              <a:t>07.01.2016</a:t>
+              <a:t>10.01.2016</a:t>
             </a:fld>
             <a:endParaRPr lang="ru-RU" dirty="0"/>
           </a:p>
@@ -6875,7 +6875,7 @@
           <a:p>
             <a:fld id="{FF11F0EC-4F60-4544-9956-271209A740FE}" type="datetimeFigureOut">
               <a:rPr lang="ru-RU" smtClean="0"/>
-              <a:t>07.01.2016</a:t>
+              <a:t>10.01.2016</a:t>
             </a:fld>
             <a:endParaRPr lang="ru-RU" dirty="0"/>
           </a:p>
@@ -7726,7 +7726,7 @@
         <p:spPr>
           <a:xfrm>
             <a:off x="1136824" y="867837"/>
-            <a:ext cx="4467890" cy="2585323"/>
+            <a:ext cx="4467890" cy="3000821"/>
           </a:xfrm>
           <a:prstGeom prst="rect">
             <a:avLst/>
@@ -7761,7 +7761,11 @@
             </a:pPr>
             <a:r>
               <a:rPr lang="en-US" dirty="0" smtClean="0"/>
-              <a:t>Creating website on the IIS</a:t>
+              <a:t>Creating website on the </a:t>
+            </a:r>
+            <a:r>
+              <a:rPr lang="en-US" dirty="0" smtClean="0"/>
+              <a:t>IIS</a:t>
             </a:r>
           </a:p>
           <a:p>
@@ -7774,8 +7778,9 @@
             </a:pPr>
             <a:r>
               <a:rPr lang="en-US" dirty="0" smtClean="0"/>
-              <a:t>Modifying XML files</a:t>
-            </a:r>
+              <a:t>ICE Validation</a:t>
+            </a:r>
+            <a:endParaRPr lang="en-US" dirty="0" smtClean="0"/>
           </a:p>
           <a:p>
             <a:pPr marL="285750" indent="-285750">
@@ -7787,7 +7792,7 @@
             </a:pPr>
             <a:r>
               <a:rPr lang="en-US" dirty="0" smtClean="0"/>
-              <a:t>Creating custom UI windows</a:t>
+              <a:t>Modifying XML files</a:t>
             </a:r>
           </a:p>
           <a:p>
@@ -7800,7 +7805,7 @@
             </a:pPr>
             <a:r>
               <a:rPr lang="en-US" dirty="0" smtClean="0"/>
-              <a:t>Modifying built-in UI</a:t>
+              <a:t>Creating custom UI windows</a:t>
             </a:r>
           </a:p>
           <a:p>
@@ -7813,11 +7818,20 @@
             </a:pPr>
             <a:r>
               <a:rPr lang="en-US" dirty="0" smtClean="0"/>
-              <a:t>Persisting </a:t>
-            </a:r>
+              <a:t>Modifying built-in UI</a:t>
+            </a:r>
+          </a:p>
+          <a:p>
+            <a:pPr marL="285750" indent="-285750">
+              <a:lnSpc>
+                <a:spcPct val="150000"/>
+              </a:lnSpc>
+              <a:buFont typeface="Arial" panose="020B0604020202020204" pitchFamily="34" charset="0"/>
+              <a:buChar char="•"/>
+            </a:pPr>
             <a:r>
               <a:rPr lang="en-US" dirty="0" smtClean="0"/>
-              <a:t>properties pattern</a:t>
+              <a:t>Persisting properties pattern</a:t>
             </a:r>
           </a:p>
         </p:txBody>
@@ -8114,6 +8128,55 @@
                                           <p:spTgt spid="7">
                                             <p:txEl>
                                               <p:pRg st="5" end="5"/>
+                                            </p:txEl>
+                                          </p:spTgt>
+                                        </p:tgtEl>
+                                        <p:attrNameLst>
+                                          <p:attrName>style.visibility</p:attrName>
+                                        </p:attrNameLst>
+                                      </p:cBhvr>
+                                      <p:to>
+                                        <p:strVal val="visible"/>
+                                      </p:to>
+                                    </p:set>
+                                  </p:childTnLst>
+                                </p:cTn>
+                              </p:par>
+                            </p:childTnLst>
+                          </p:cTn>
+                        </p:par>
+                      </p:childTnLst>
+                    </p:cTn>
+                  </p:par>
+                  <p:par>
+                    <p:cTn id="27" fill="hold">
+                      <p:stCondLst>
+                        <p:cond delay="indefinite"/>
+                      </p:stCondLst>
+                      <p:childTnLst>
+                        <p:par>
+                          <p:cTn id="28" fill="hold">
+                            <p:stCondLst>
+                              <p:cond delay="0"/>
+                            </p:stCondLst>
+                            <p:childTnLst>
+                              <p:par>
+                                <p:cTn id="29" presetID="1" presetClass="entr" presetSubtype="0" fill="hold" nodeType="clickEffect">
+                                  <p:stCondLst>
+                                    <p:cond delay="0"/>
+                                  </p:stCondLst>
+                                  <p:childTnLst>
+                                    <p:set>
+                                      <p:cBhvr>
+                                        <p:cTn id="30" dur="1" fill="hold">
+                                          <p:stCondLst>
+                                            <p:cond delay="0"/>
+                                          </p:stCondLst>
+                                        </p:cTn>
+                                        <p:tgtEl>
+                                          <p:spTgt spid="7">
+                                            <p:txEl>
+                                              <p:pRg st="6" end="6"/>
                                             </p:txEl>
                                           </p:spTgt>
                                         </p:tgtEl>

</xml_diff>